<commit_message>
Fixing typo in v2 poster
</commit_message>
<xml_diff>
--- a/devdocs/EnvNoiseDetectorPosterExampleWhite_v2.pptx
+++ b/devdocs/EnvNoiseDetectorPosterExampleWhite_v2.pptx
@@ -4020,12 +4020,20 @@
               <a:buChar char="•"/>
             </a:pPr>
             <a:r>
+              <a:rPr lang="en-US" sz="3000">
+                <a:latin typeface="Open Sans" panose="020B0606030504020204" pitchFamily="34" charset="0"/>
+                <a:ea typeface="Open Sans" panose="020B0606030504020204" pitchFamily="34" charset="0"/>
+                <a:cs typeface="Open Sans" panose="020B0606030504020204" pitchFamily="34" charset="0"/>
+              </a:rPr>
+              <a:t>72 </a:t>
+            </a:r>
+            <a:r>
               <a:rPr lang="en-US" sz="3000" dirty="0">
                 <a:latin typeface="Open Sans" panose="020B0606030504020204" pitchFamily="34" charset="0"/>
                 <a:ea typeface="Open Sans" panose="020B0606030504020204" pitchFamily="34" charset="0"/>
                 <a:cs typeface="Open Sans" panose="020B0606030504020204" pitchFamily="34" charset="0"/>
               </a:rPr>
-              <a:t>66 Total</a:t>
+              <a:t>Total</a:t>
             </a:r>
           </a:p>
           <a:p>
@@ -4053,7 +4061,7 @@
                 <a:ea typeface="Open Sans" panose="020B0606030504020204" pitchFamily="34" charset="0"/>
                 <a:cs typeface="Open Sans" panose="020B0606030504020204" pitchFamily="34" charset="0"/>
               </a:rPr>
-              <a:t>49 Aircraft and Ambient Recordings</a:t>
+              <a:t>59 Aircraft and Ambient Recordings</a:t>
             </a:r>
           </a:p>
           <a:p>

</xml_diff>

<commit_message>
Mnor spacing chnage on poster
</commit_message>
<xml_diff>
--- a/devdocs/EnvNoiseDetectorPosterExampleWhite_v2.pptx
+++ b/devdocs/EnvNoiseDetectorPosterExampleWhite_v2.pptx
@@ -131,12 +131,12 @@
   <pc:docChgLst>
     <pc:chgData name="Todd Schultz" userId="ba2af144d448b369" providerId="LiveId" clId="{DCCFD9F7-8467-4B55-949C-D4DF018331E4}"/>
     <pc:docChg chg="undo custSel modSld">
-      <pc:chgData name="Todd Schultz" userId="ba2af144d448b369" providerId="LiveId" clId="{DCCFD9F7-8467-4B55-949C-D4DF018331E4}" dt="2019-03-08T04:41:29.372" v="1630" actId="1036"/>
+      <pc:chgData name="Todd Schultz" userId="ba2af144d448b369" providerId="LiveId" clId="{DCCFD9F7-8467-4B55-949C-D4DF018331E4}" dt="2019-03-10T04:07:53.516" v="1661" actId="1036"/>
       <pc:docMkLst>
         <pc:docMk/>
       </pc:docMkLst>
       <pc:sldChg chg="modSp">
-        <pc:chgData name="Todd Schultz" userId="ba2af144d448b369" providerId="LiveId" clId="{DCCFD9F7-8467-4B55-949C-D4DF018331E4}" dt="2019-03-08T04:41:29.372" v="1630" actId="1036"/>
+        <pc:chgData name="Todd Schultz" userId="ba2af144d448b369" providerId="LiveId" clId="{DCCFD9F7-8467-4B55-949C-D4DF018331E4}" dt="2019-03-10T04:07:53.516" v="1661" actId="1036"/>
         <pc:sldMkLst>
           <pc:docMk/>
           <pc:sldMk cId="2702275411" sldId="256"/>
@@ -206,7 +206,7 @@
           </ac:spMkLst>
         </pc:spChg>
         <pc:spChg chg="mod">
-          <ac:chgData name="Todd Schultz" userId="ba2af144d448b369" providerId="LiveId" clId="{DCCFD9F7-8467-4B55-949C-D4DF018331E4}" dt="2019-03-08T04:33:11.145" v="905" actId="403"/>
+          <ac:chgData name="Todd Schultz" userId="ba2af144d448b369" providerId="LiveId" clId="{DCCFD9F7-8467-4B55-949C-D4DF018331E4}" dt="2019-03-10T04:07:53.516" v="1661" actId="1036"/>
           <ac:spMkLst>
             <pc:docMk/>
             <pc:sldMk cId="2702275411" sldId="256"/>
@@ -230,7 +230,7 @@
           </ac:spMkLst>
         </pc:spChg>
         <pc:spChg chg="mod">
-          <ac:chgData name="Todd Schultz" userId="ba2af144d448b369" providerId="LiveId" clId="{DCCFD9F7-8467-4B55-949C-D4DF018331E4}" dt="2019-03-08T04:41:29.372" v="1630" actId="1036"/>
+          <ac:chgData name="Todd Schultz" userId="ba2af144d448b369" providerId="LiveId" clId="{DCCFD9F7-8467-4B55-949C-D4DF018331E4}" dt="2019-03-10T04:06:26.307" v="1650" actId="1035"/>
           <ac:spMkLst>
             <pc:docMk/>
             <pc:sldMk cId="2702275411" sldId="256"/>
@@ -238,7 +238,7 @@
           </ac:spMkLst>
         </pc:spChg>
         <pc:spChg chg="mod">
-          <ac:chgData name="Todd Schultz" userId="ba2af144d448b369" providerId="LiveId" clId="{DCCFD9F7-8467-4B55-949C-D4DF018331E4}" dt="2019-03-08T04:41:26.158" v="1625" actId="1036"/>
+          <ac:chgData name="Todd Schultz" userId="ba2af144d448b369" providerId="LiveId" clId="{DCCFD9F7-8467-4B55-949C-D4DF018331E4}" dt="2019-03-10T04:06:37.293" v="1659" actId="1035"/>
           <ac:spMkLst>
             <pc:docMk/>
             <pc:sldMk cId="2702275411" sldId="256"/>
@@ -6191,7 +6191,7 @@
         </p:nvSpPr>
         <p:spPr>
           <a:xfrm>
-            <a:off x="16324043" y="5627410"/>
+            <a:off x="16324043" y="5686404"/>
             <a:ext cx="6075736" cy="2246769"/>
           </a:xfrm>
           <a:prstGeom prst="rect">
@@ -6713,7 +6713,7 @@
         </p:nvSpPr>
         <p:spPr>
           <a:xfrm>
-            <a:off x="34749291" y="24553893"/>
+            <a:off x="34749291" y="24052444"/>
             <a:ext cx="8277225" cy="646331"/>
           </a:xfrm>
           <a:prstGeom prst="rect">
@@ -6766,7 +6766,7 @@
         </p:nvSpPr>
         <p:spPr>
           <a:xfrm>
-            <a:off x="34742591" y="25245655"/>
+            <a:off x="34742591" y="24862194"/>
             <a:ext cx="8277225" cy="4247317"/>
           </a:xfrm>
           <a:prstGeom prst="rect">

</xml_diff>